<commit_message>
OS Memory Management Update for one question as i get one intution
</commit_message>
<xml_diff>
--- a/GATE/Operating System ✅/CH 05 - Memory Management - completed/Types of Question from MM.pptx
+++ b/GATE/Operating System ✅/CH 05 - Memory Management - completed/Types of Question from MM.pptx
@@ -23,8 +23,10 @@
     <p:sldId id="278" r:id="rId17"/>
     <p:sldId id="258" r:id="rId18"/>
     <p:sldId id="277" r:id="rId19"/>
-    <p:sldId id="259" r:id="rId20"/>
-    <p:sldId id="281" r:id="rId21"/>
+    <p:sldId id="282" r:id="rId20"/>
+    <p:sldId id="283" r:id="rId21"/>
+    <p:sldId id="259" r:id="rId22"/>
+    <p:sldId id="281" r:id="rId23"/>
   </p:sldIdLst>
   <p:sldSz cx="12192000" cy="6858000"/>
   <p:notesSz cx="6858000" cy="9144000"/>
@@ -280,7 +282,7 @@
           <a:p>
             <a:fld id="{04AC843D-DCF7-48B1-920A-2F35EF3B9961}" type="datetimeFigureOut">
               <a:rPr lang="en-IN" smtClean="0"/>
-              <a:t>20-12-2025</a:t>
+              <a:t>03-02-2026</a:t>
             </a:fld>
             <a:endParaRPr lang="en-IN"/>
           </a:p>
@@ -480,7 +482,7 @@
           <a:p>
             <a:fld id="{04AC843D-DCF7-48B1-920A-2F35EF3B9961}" type="datetimeFigureOut">
               <a:rPr lang="en-IN" smtClean="0"/>
-              <a:t>20-12-2025</a:t>
+              <a:t>03-02-2026</a:t>
             </a:fld>
             <a:endParaRPr lang="en-IN"/>
           </a:p>
@@ -690,7 +692,7 @@
           <a:p>
             <a:fld id="{04AC843D-DCF7-48B1-920A-2F35EF3B9961}" type="datetimeFigureOut">
               <a:rPr lang="en-IN" smtClean="0"/>
-              <a:t>20-12-2025</a:t>
+              <a:t>03-02-2026</a:t>
             </a:fld>
             <a:endParaRPr lang="en-IN"/>
           </a:p>
@@ -890,7 +892,7 @@
           <a:p>
             <a:fld id="{04AC843D-DCF7-48B1-920A-2F35EF3B9961}" type="datetimeFigureOut">
               <a:rPr lang="en-IN" smtClean="0"/>
-              <a:t>20-12-2025</a:t>
+              <a:t>03-02-2026</a:t>
             </a:fld>
             <a:endParaRPr lang="en-IN"/>
           </a:p>
@@ -1166,7 +1168,7 @@
           <a:p>
             <a:fld id="{04AC843D-DCF7-48B1-920A-2F35EF3B9961}" type="datetimeFigureOut">
               <a:rPr lang="en-IN" smtClean="0"/>
-              <a:t>20-12-2025</a:t>
+              <a:t>03-02-2026</a:t>
             </a:fld>
             <a:endParaRPr lang="en-IN"/>
           </a:p>
@@ -1434,7 +1436,7 @@
           <a:p>
             <a:fld id="{04AC843D-DCF7-48B1-920A-2F35EF3B9961}" type="datetimeFigureOut">
               <a:rPr lang="en-IN" smtClean="0"/>
-              <a:t>20-12-2025</a:t>
+              <a:t>03-02-2026</a:t>
             </a:fld>
             <a:endParaRPr lang="en-IN"/>
           </a:p>
@@ -1849,7 +1851,7 @@
           <a:p>
             <a:fld id="{04AC843D-DCF7-48B1-920A-2F35EF3B9961}" type="datetimeFigureOut">
               <a:rPr lang="en-IN" smtClean="0"/>
-              <a:t>20-12-2025</a:t>
+              <a:t>03-02-2026</a:t>
             </a:fld>
             <a:endParaRPr lang="en-IN"/>
           </a:p>
@@ -1991,7 +1993,7 @@
           <a:p>
             <a:fld id="{04AC843D-DCF7-48B1-920A-2F35EF3B9961}" type="datetimeFigureOut">
               <a:rPr lang="en-IN" smtClean="0"/>
-              <a:t>20-12-2025</a:t>
+              <a:t>03-02-2026</a:t>
             </a:fld>
             <a:endParaRPr lang="en-IN"/>
           </a:p>
@@ -2104,7 +2106,7 @@
           <a:p>
             <a:fld id="{04AC843D-DCF7-48B1-920A-2F35EF3B9961}" type="datetimeFigureOut">
               <a:rPr lang="en-IN" smtClean="0"/>
-              <a:t>20-12-2025</a:t>
+              <a:t>03-02-2026</a:t>
             </a:fld>
             <a:endParaRPr lang="en-IN"/>
           </a:p>
@@ -2417,7 +2419,7 @@
           <a:p>
             <a:fld id="{04AC843D-DCF7-48B1-920A-2F35EF3B9961}" type="datetimeFigureOut">
               <a:rPr lang="en-IN" smtClean="0"/>
-              <a:t>20-12-2025</a:t>
+              <a:t>03-02-2026</a:t>
             </a:fld>
             <a:endParaRPr lang="en-IN"/>
           </a:p>
@@ -2706,7 +2708,7 @@
           <a:p>
             <a:fld id="{04AC843D-DCF7-48B1-920A-2F35EF3B9961}" type="datetimeFigureOut">
               <a:rPr lang="en-IN" smtClean="0"/>
-              <a:t>20-12-2025</a:t>
+              <a:t>03-02-2026</a:t>
             </a:fld>
             <a:endParaRPr lang="en-IN"/>
           </a:p>
@@ -2949,7 +2951,7 @@
           <a:p>
             <a:fld id="{04AC843D-DCF7-48B1-920A-2F35EF3B9961}" type="datetimeFigureOut">
               <a:rPr lang="en-IN" smtClean="0"/>
-              <a:t>20-12-2025</a:t>
+              <a:t>03-02-2026</a:t>
             </a:fld>
             <a:endParaRPr lang="en-IN"/>
           </a:p>
@@ -4279,7 +4281,7 @@
         </p:blipFill>
         <p:spPr>
           <a:xfrm>
-            <a:off x="4417778" y="280029"/>
+            <a:off x="590496" y="280029"/>
             <a:ext cx="3356443" cy="6297942"/>
           </a:xfrm>
           <a:prstGeom prst="rect">
@@ -4317,49 +4319,19 @@
           <a:chExt cx="0" cy="0"/>
         </a:xfrm>
       </p:grpSpPr>
-      <p:sp>
-        <p:nvSpPr>
-          <p:cNvPr id="2" name="Title 1">
-            <a:extLst>
-              <a:ext uri="{FF2B5EF4-FFF2-40B4-BE49-F238E27FC236}">
-                <a16:creationId xmlns:a16="http://schemas.microsoft.com/office/drawing/2014/main" id="{0BD1B6A3-A3A0-412B-B271-53B153ECC251}"/>
-              </a:ext>
-            </a:extLst>
-          </p:cNvPr>
-          <p:cNvSpPr>
-            <a:spLocks noGrp="1"/>
-          </p:cNvSpPr>
-          <p:nvPr>
-            <p:ph type="title"/>
-          </p:nvPr>
-        </p:nvSpPr>
-        <p:spPr/>
-        <p:txBody>
-          <a:bodyPr/>
-          <a:lstStyle/>
-          <a:p>
-            <a:r>
-              <a:rPr lang="en-IN" dirty="0"/>
-              <a:t>Theory</a:t>
-            </a:r>
-          </a:p>
-        </p:txBody>
-      </p:sp>
       <p:pic>
         <p:nvPicPr>
-          <p:cNvPr id="7" name="Content Placeholder 6">
-            <a:extLst>
-              <a:ext uri="{FF2B5EF4-FFF2-40B4-BE49-F238E27FC236}">
-                <a16:creationId xmlns:a16="http://schemas.microsoft.com/office/drawing/2014/main" id="{AC3FC2DA-9BAB-4AEE-9166-19724C557740}"/>
+          <p:cNvPr id="4" name="Picture 3">
+            <a:extLst>
+              <a:ext uri="{FF2B5EF4-FFF2-40B4-BE49-F238E27FC236}">
+                <a16:creationId xmlns:a16="http://schemas.microsoft.com/office/drawing/2014/main" id="{61F02571-C2D9-4F5B-B5BC-52B496B9A6E2}"/>
               </a:ext>
             </a:extLst>
           </p:cNvPr>
           <p:cNvPicPr>
-            <a:picLocks noGrp="1" noChangeAspect="1"/>
+            <a:picLocks noChangeAspect="1"/>
           </p:cNvPicPr>
-          <p:nvPr>
-            <p:ph idx="1"/>
-          </p:nvPr>
+          <p:nvPr/>
         </p:nvPicPr>
         <p:blipFill>
           <a:blip r:embed="rId2"/>
@@ -4369,17 +4341,20 @@
         </p:blipFill>
         <p:spPr>
           <a:xfrm>
-            <a:off x="838200" y="1867692"/>
-            <a:ext cx="7658764" cy="967824"/>
-          </a:xfrm>
+            <a:off x="0" y="0"/>
+            <a:ext cx="6759526" cy="5425910"/>
+          </a:xfrm>
+          <a:prstGeom prst="rect">
+            <a:avLst/>
+          </a:prstGeom>
         </p:spPr>
       </p:pic>
       <p:pic>
         <p:nvPicPr>
-          <p:cNvPr id="11" name="Picture 10">
-            <a:extLst>
-              <a:ext uri="{FF2B5EF4-FFF2-40B4-BE49-F238E27FC236}">
-                <a16:creationId xmlns:a16="http://schemas.microsoft.com/office/drawing/2014/main" id="{901E44C5-0F39-4D0F-A362-79EAF4C1732F}"/>
+          <p:cNvPr id="5" name="Picture 4">
+            <a:extLst>
+              <a:ext uri="{FF2B5EF4-FFF2-40B4-BE49-F238E27FC236}">
+                <a16:creationId xmlns:a16="http://schemas.microsoft.com/office/drawing/2014/main" id="{DDEB526B-091E-4745-8931-21D877F50408}"/>
               </a:ext>
             </a:extLst>
           </p:cNvPr>
@@ -4396,8 +4371,8 @@
         </p:blipFill>
         <p:spPr>
           <a:xfrm>
-            <a:off x="838200" y="3012520"/>
-            <a:ext cx="8847587" cy="1988992"/>
+            <a:off x="6189239" y="1828978"/>
+            <a:ext cx="5639289" cy="4953429"/>
           </a:xfrm>
           <a:prstGeom prst="rect">
             <a:avLst/>
@@ -4407,7 +4382,7 @@
     </p:spTree>
     <p:extLst>
       <p:ext uri="{BB962C8B-B14F-4D97-AF65-F5344CB8AC3E}">
-        <p14:creationId xmlns:p14="http://schemas.microsoft.com/office/powerpoint/2010/main" val="3279920293"/>
+        <p14:creationId xmlns:p14="http://schemas.microsoft.com/office/powerpoint/2010/main" val="3689562315"/>
       </p:ext>
     </p:extLst>
   </p:cSld>
@@ -4693,6 +4668,183 @@
 </file>
 
 <file path=ppt/slides/slide20.xml><?xml version="1.0" encoding="utf-8"?>
+<p:sld xmlns:a="http://schemas.openxmlformats.org/drawingml/2006/main" xmlns:r="http://schemas.openxmlformats.org/officeDocument/2006/relationships" xmlns:p="http://schemas.openxmlformats.org/presentationml/2006/main">
+  <p:cSld>
+    <p:spTree>
+      <p:nvGrpSpPr>
+        <p:cNvPr id="1" name=""/>
+        <p:cNvGrpSpPr/>
+        <p:nvPr/>
+      </p:nvGrpSpPr>
+      <p:grpSpPr>
+        <a:xfrm>
+          <a:off x="0" y="0"/>
+          <a:ext cx="0" cy="0"/>
+          <a:chOff x="0" y="0"/>
+          <a:chExt cx="0" cy="0"/>
+        </a:xfrm>
+      </p:grpSpPr>
+      <p:pic>
+        <p:nvPicPr>
+          <p:cNvPr id="3" name="Picture 2">
+            <a:extLst>
+              <a:ext uri="{FF2B5EF4-FFF2-40B4-BE49-F238E27FC236}">
+                <a16:creationId xmlns:a16="http://schemas.microsoft.com/office/drawing/2014/main" id="{ABD1B25D-2CD8-43A7-858A-5D6E1B6089B1}"/>
+              </a:ext>
+            </a:extLst>
+          </p:cNvPr>
+          <p:cNvPicPr>
+            <a:picLocks noChangeAspect="1"/>
+          </p:cNvPicPr>
+          <p:nvPr/>
+        </p:nvPicPr>
+        <p:blipFill>
+          <a:blip r:embed="rId2"/>
+          <a:stretch>
+            <a:fillRect/>
+          </a:stretch>
+        </p:blipFill>
+        <p:spPr>
+          <a:xfrm>
+            <a:off x="506138" y="383026"/>
+            <a:ext cx="11179724" cy="6091946"/>
+          </a:xfrm>
+          <a:prstGeom prst="rect">
+            <a:avLst/>
+          </a:prstGeom>
+        </p:spPr>
+      </p:pic>
+    </p:spTree>
+    <p:extLst>
+      <p:ext uri="{BB962C8B-B14F-4D97-AF65-F5344CB8AC3E}">
+        <p14:creationId xmlns:p14="http://schemas.microsoft.com/office/powerpoint/2010/main" val="4015100174"/>
+      </p:ext>
+    </p:extLst>
+  </p:cSld>
+  <p:clrMapOvr>
+    <a:masterClrMapping/>
+  </p:clrMapOvr>
+</p:sld>
+</file>
+
+<file path=ppt/slides/slide21.xml><?xml version="1.0" encoding="utf-8"?>
+<p:sld xmlns:a="http://schemas.openxmlformats.org/drawingml/2006/main" xmlns:r="http://schemas.openxmlformats.org/officeDocument/2006/relationships" xmlns:p="http://schemas.openxmlformats.org/presentationml/2006/main">
+  <p:cSld>
+    <p:spTree>
+      <p:nvGrpSpPr>
+        <p:cNvPr id="1" name=""/>
+        <p:cNvGrpSpPr/>
+        <p:nvPr/>
+      </p:nvGrpSpPr>
+      <p:grpSpPr>
+        <a:xfrm>
+          <a:off x="0" y="0"/>
+          <a:ext cx="0" cy="0"/>
+          <a:chOff x="0" y="0"/>
+          <a:chExt cx="0" cy="0"/>
+        </a:xfrm>
+      </p:grpSpPr>
+      <p:sp>
+        <p:nvSpPr>
+          <p:cNvPr id="2" name="Title 1">
+            <a:extLst>
+              <a:ext uri="{FF2B5EF4-FFF2-40B4-BE49-F238E27FC236}">
+                <a16:creationId xmlns:a16="http://schemas.microsoft.com/office/drawing/2014/main" id="{0BD1B6A3-A3A0-412B-B271-53B153ECC251}"/>
+              </a:ext>
+            </a:extLst>
+          </p:cNvPr>
+          <p:cNvSpPr>
+            <a:spLocks noGrp="1"/>
+          </p:cNvSpPr>
+          <p:nvPr>
+            <p:ph type="title"/>
+          </p:nvPr>
+        </p:nvSpPr>
+        <p:spPr/>
+        <p:txBody>
+          <a:bodyPr/>
+          <a:lstStyle/>
+          <a:p>
+            <a:r>
+              <a:rPr lang="en-IN" dirty="0"/>
+              <a:t>Theory</a:t>
+            </a:r>
+          </a:p>
+        </p:txBody>
+      </p:sp>
+      <p:pic>
+        <p:nvPicPr>
+          <p:cNvPr id="7" name="Content Placeholder 6">
+            <a:extLst>
+              <a:ext uri="{FF2B5EF4-FFF2-40B4-BE49-F238E27FC236}">
+                <a16:creationId xmlns:a16="http://schemas.microsoft.com/office/drawing/2014/main" id="{AC3FC2DA-9BAB-4AEE-9166-19724C557740}"/>
+              </a:ext>
+            </a:extLst>
+          </p:cNvPr>
+          <p:cNvPicPr>
+            <a:picLocks noGrp="1" noChangeAspect="1"/>
+          </p:cNvPicPr>
+          <p:nvPr>
+            <p:ph idx="1"/>
+          </p:nvPr>
+        </p:nvPicPr>
+        <p:blipFill>
+          <a:blip r:embed="rId2"/>
+          <a:stretch>
+            <a:fillRect/>
+          </a:stretch>
+        </p:blipFill>
+        <p:spPr>
+          <a:xfrm>
+            <a:off x="838200" y="1867692"/>
+            <a:ext cx="7658764" cy="967824"/>
+          </a:xfrm>
+        </p:spPr>
+      </p:pic>
+      <p:pic>
+        <p:nvPicPr>
+          <p:cNvPr id="11" name="Picture 10">
+            <a:extLst>
+              <a:ext uri="{FF2B5EF4-FFF2-40B4-BE49-F238E27FC236}">
+                <a16:creationId xmlns:a16="http://schemas.microsoft.com/office/drawing/2014/main" id="{901E44C5-0F39-4D0F-A362-79EAF4C1732F}"/>
+              </a:ext>
+            </a:extLst>
+          </p:cNvPr>
+          <p:cNvPicPr>
+            <a:picLocks noChangeAspect="1"/>
+          </p:cNvPicPr>
+          <p:nvPr/>
+        </p:nvPicPr>
+        <p:blipFill>
+          <a:blip r:embed="rId3"/>
+          <a:stretch>
+            <a:fillRect/>
+          </a:stretch>
+        </p:blipFill>
+        <p:spPr>
+          <a:xfrm>
+            <a:off x="838200" y="3012520"/>
+            <a:ext cx="8847587" cy="1988992"/>
+          </a:xfrm>
+          <a:prstGeom prst="rect">
+            <a:avLst/>
+          </a:prstGeom>
+        </p:spPr>
+      </p:pic>
+    </p:spTree>
+    <p:extLst>
+      <p:ext uri="{BB962C8B-B14F-4D97-AF65-F5344CB8AC3E}">
+        <p14:creationId xmlns:p14="http://schemas.microsoft.com/office/powerpoint/2010/main" val="3279920293"/>
+      </p:ext>
+    </p:extLst>
+  </p:cSld>
+  <p:clrMapOvr>
+    <a:masterClrMapping/>
+  </p:clrMapOvr>
+</p:sld>
+</file>
+
+<file path=ppt/slides/slide22.xml><?xml version="1.0" encoding="utf-8"?>
 <p:sld xmlns:a="http://schemas.openxmlformats.org/drawingml/2006/main" xmlns:r="http://schemas.openxmlformats.org/officeDocument/2006/relationships" xmlns:p="http://schemas.openxmlformats.org/presentationml/2006/main">
   <p:cSld>
     <p:spTree>

</xml_diff>